<commit_message>
Update PYTHON_12_Lists Part 2.pptx
</commit_message>
<xml_diff>
--- a/PYTHON_12_Lists Part 2.pptx
+++ b/PYTHON_12_Lists Part 2.pptx
@@ -17,7 +17,8 @@
     <p:sldId id="300" r:id="rId11"/>
     <p:sldId id="301" r:id="rId12"/>
     <p:sldId id="302" r:id="rId13"/>
-    <p:sldId id="291" r:id="rId14"/>
+    <p:sldId id="303" r:id="rId14"/>
+    <p:sldId id="291" r:id="rId15"/>
   </p:sldIdLst>
   <p:sldSz cx="12192000" cy="6858000"/>
   <p:notesSz cx="6858000" cy="9144000"/>
@@ -4022,6 +4023,126 @@
           <p:cNvPr id="2" name="Title 1">
             <a:extLst>
               <a:ext uri="{FF2B5EF4-FFF2-40B4-BE49-F238E27FC236}">
+                <a16:creationId xmlns:a16="http://schemas.microsoft.com/office/drawing/2014/main" id="{C62A1AF2-26C6-4D81-8703-E2994A4E6D61}"/>
+              </a:ext>
+            </a:extLst>
+          </p:cNvPr>
+          <p:cNvSpPr>
+            <a:spLocks noGrp="1"/>
+          </p:cNvSpPr>
+          <p:nvPr>
+            <p:ph type="title"/>
+          </p:nvPr>
+        </p:nvSpPr>
+        <p:spPr/>
+        <p:txBody>
+          <a:bodyPr/>
+          <a:lstStyle/>
+          <a:p>
+            <a:r>
+              <a:rPr lang="en-US" dirty="0"/>
+              <a:t>Practice Questions</a:t>
+            </a:r>
+          </a:p>
+        </p:txBody>
+      </p:sp>
+      <p:sp>
+        <p:nvSpPr>
+          <p:cNvPr id="3" name="Content Placeholder 2">
+            <a:extLst>
+              <a:ext uri="{FF2B5EF4-FFF2-40B4-BE49-F238E27FC236}">
+                <a16:creationId xmlns:a16="http://schemas.microsoft.com/office/drawing/2014/main" id="{0920BD14-1CED-458D-8AAF-7EF8B56938A6}"/>
+              </a:ext>
+            </a:extLst>
+          </p:cNvPr>
+          <p:cNvSpPr>
+            <a:spLocks noGrp="1"/>
+          </p:cNvSpPr>
+          <p:nvPr>
+            <p:ph idx="1"/>
+          </p:nvPr>
+        </p:nvSpPr>
+        <p:spPr/>
+        <p:txBody>
+          <a:bodyPr/>
+          <a:lstStyle/>
+          <a:p>
+            <a:r>
+              <a:rPr lang="en-US" dirty="0"/>
+              <a:t>Write a Python function to find the Max of three numbers.</a:t>
+            </a:r>
+          </a:p>
+          <a:p>
+            <a:r>
+              <a:rPr lang="en-US" dirty="0"/>
+              <a:t>Write a Python function to make a calculator.</a:t>
+            </a:r>
+          </a:p>
+          <a:p>
+            <a:r>
+              <a:rPr lang="en-US" dirty="0"/>
+              <a:t>Write a function to print the sum of 100 numbers. </a:t>
+            </a:r>
+            <a:r>
+              <a:rPr lang="en-US"/>
+              <a:t>(</a:t>
+            </a:r>
+            <a:r>
+              <a:rPr lang="en-US">
+                <a:solidFill>
+                  <a:srgbClr val="00B050"/>
+                </a:solidFill>
+              </a:rPr>
+              <a:t>Use while loop</a:t>
+            </a:r>
+            <a:r>
+              <a:rPr lang="en-US"/>
+              <a:t>)</a:t>
+            </a:r>
+          </a:p>
+          <a:p>
+            <a:pPr marL="0" indent="0">
+              <a:buNone/>
+            </a:pPr>
+            <a:endParaRPr lang="en-US" dirty="0"/>
+          </a:p>
+        </p:txBody>
+      </p:sp>
+    </p:spTree>
+    <p:extLst>
+      <p:ext uri="{BB962C8B-B14F-4D97-AF65-F5344CB8AC3E}">
+        <p14:creationId xmlns:p14="http://schemas.microsoft.com/office/powerpoint/2010/main" val="3396028398"/>
+      </p:ext>
+    </p:extLst>
+  </p:cSld>
+  <p:clrMapOvr>
+    <a:masterClrMapping/>
+  </p:clrMapOvr>
+</p:sld>
+</file>
+
+<file path=ppt/slides/slide14.xml><?xml version="1.0" encoding="utf-8"?>
+<p:sld xmlns:a="http://schemas.openxmlformats.org/drawingml/2006/main" xmlns:r="http://schemas.openxmlformats.org/officeDocument/2006/relationships" xmlns:p="http://schemas.openxmlformats.org/presentationml/2006/main">
+  <p:cSld>
+    <p:spTree>
+      <p:nvGrpSpPr>
+        <p:cNvPr id="1" name=""/>
+        <p:cNvGrpSpPr/>
+        <p:nvPr/>
+      </p:nvGrpSpPr>
+      <p:grpSpPr>
+        <a:xfrm>
+          <a:off x="0" y="0"/>
+          <a:ext cx="0" cy="0"/>
+          <a:chOff x="0" y="0"/>
+          <a:chExt cx="0" cy="0"/>
+        </a:xfrm>
+      </p:grpSpPr>
+      <p:sp>
+        <p:nvSpPr>
+          <p:cNvPr id="2" name="Title 1">
+            <a:extLst>
+              <a:ext uri="{FF2B5EF4-FFF2-40B4-BE49-F238E27FC236}">
                 <a16:creationId xmlns:a16="http://schemas.microsoft.com/office/drawing/2014/main" id="{4EFC647E-BEC0-4E89-8B7A-37CA0A51DB61}"/>
               </a:ext>
             </a:extLst>
@@ -4794,7 +4915,12 @@
             <p:ph idx="1"/>
           </p:nvPr>
         </p:nvSpPr>
-        <p:spPr/>
+        <p:spPr>
+          <a:xfrm>
+            <a:off x="838200" y="1825625"/>
+            <a:ext cx="10515600" cy="4351338"/>
+          </a:xfrm>
+        </p:spPr>
         <p:txBody>
           <a:bodyPr/>
           <a:lstStyle/>

</xml_diff>